<commit_message>
added link for github
</commit_message>
<xml_diff>
--- a/centos.pptx
+++ b/centos.pptx
@@ -4206,17 +4206,21 @@
         </p:nvSpPr>
         <p:spPr>
           <a:xfrm>
-            <a:off x="571472" y="4643446"/>
-            <a:ext cx="8229600" cy="714380"/>
+            <a:off x="142844" y="4643446"/>
+            <a:ext cx="8858312" cy="714380"/>
           </a:xfrm>
         </p:spPr>
         <p:txBody>
           <a:bodyPr>
-            <a:normAutofit fontScale="90000"/>
+            <a:noAutofit/>
           </a:bodyPr>
           <a:lstStyle/>
           <a:p>
-            <a:endParaRPr lang="ru-RU" dirty="0"/>
+            <a:r>
+              <a:rPr lang="en-US" sz="2400" dirty="0" smtClean="0"/>
+              <a:t>https://github.com/adeveloper24/centos_guide</a:t>
+            </a:r>
+            <a:endParaRPr lang="ru-RU" sz="2400" dirty="0"/>
           </a:p>
         </p:txBody>
       </p:sp>
@@ -5049,15 +5053,7 @@
                   <a:srgbClr val="05FF05"/>
                 </a:solidFill>
               </a:rPr>
-              <a:t> нет </a:t>
-            </a:r>
-            <a:r>
-              <a:rPr lang="ru-RU" sz="2400" dirty="0" smtClean="0">
-                <a:solidFill>
-                  <a:srgbClr val="05FF05"/>
-                </a:solidFill>
-              </a:rPr>
-              <a:t>ограничения на число сайтов на сервере</a:t>
+              <a:t> нет ограничения на число сайтов на сервере</a:t>
             </a:r>
           </a:p>
           <a:p>
@@ -5071,15 +5067,7 @@
                   <a:srgbClr val="05FF05"/>
                 </a:solidFill>
               </a:rPr>
-              <a:t> нет </a:t>
-            </a:r>
-            <a:r>
-              <a:rPr lang="ru-RU" sz="2400" dirty="0" smtClean="0">
-                <a:solidFill>
-                  <a:srgbClr val="05FF05"/>
-                </a:solidFill>
-              </a:rPr>
-              <a:t>ограничения на число баз данных</a:t>
+              <a:t> нет ограничения на число баз данных</a:t>
             </a:r>
           </a:p>
           <a:p>
@@ -5156,15 +5144,7 @@
                   <a:srgbClr val="FF0000"/>
                 </a:solidFill>
               </a:rPr>
-              <a:t> сложность </a:t>
-            </a:r>
-            <a:r>
-              <a:rPr lang="ru-RU" sz="2400" dirty="0" smtClean="0">
-                <a:solidFill>
-                  <a:srgbClr val="FF0000"/>
-                </a:solidFill>
-              </a:rPr>
-              <a:t>в настройке</a:t>
+              <a:t> сложность в настройке</a:t>
             </a:r>
           </a:p>
           <a:p>
@@ -5178,15 +5158,7 @@
                   <a:srgbClr val="FF0000"/>
                 </a:solidFill>
               </a:rPr>
-              <a:t> затраты </a:t>
-            </a:r>
-            <a:r>
-              <a:rPr lang="ru-RU" sz="2400" dirty="0" smtClean="0">
-                <a:solidFill>
-                  <a:srgbClr val="FF0000"/>
-                </a:solidFill>
-              </a:rPr>
-              <a:t>времени на настройку сервера</a:t>
+              <a:t> затраты времени на настройку сервера</a:t>
             </a:r>
             <a:endParaRPr lang="ru-RU" sz="2400" dirty="0">
               <a:solidFill>
@@ -7140,11 +7112,7 @@
             </a:r>
             <a:r>
               <a:rPr lang="en-US" sz="1800" dirty="0" smtClean="0"/>
-              <a:t> </a:t>
-            </a:r>
-            <a:r>
-              <a:rPr lang="en-US" sz="1800" dirty="0" smtClean="0"/>
-              <a:t>/</a:t>
+              <a:t> /</a:t>
             </a:r>
             <a:r>
               <a:rPr lang="en-US" sz="1800" dirty="0" err="1" smtClean="0"/>
@@ -7154,7 +7122,6 @@
               <a:rPr lang="en-US" sz="1800" dirty="0" smtClean="0"/>
               <a:t>/www/example.com/error.log</a:t>
             </a:r>
-            <a:endParaRPr lang="en-US" sz="1800" dirty="0" smtClean="0"/>
           </a:p>
           <a:p>
             <a:r>

</xml_diff>